<commit_message>
updated slides with gh link
</commit_message>
<xml_diff>
--- a/Why FXCop is Awesome.pptx
+++ b/Why FXCop is Awesome.pptx
@@ -4790,6 +4790,27 @@
                 <a:hlinkClick r:id="rId5"/>
               </a:rPr>
               <a:t>https://msdn.microsoft.com/en-us/library/ms229042(v=vs.110).aspx</a:t>
+            </a:r>
+          </a:p>
+          <a:p>
+            <a:pPr rtl="0">
+              <a:spcBef>
+                <a:spcPts val="0"/>
+              </a:spcBef>
+              <a:buNone/>
+            </a:pPr>
+            <a:r>
+              <a:rPr lang="en-GB"/>
+              <a:t>Code and slides from this talk </a:t>
+            </a:r>
+            <a:r>
+              <a:rPr lang="en-GB" u="sng">
+                <a:solidFill>
+                  <a:schemeClr val="hlink"/>
+                </a:solidFill>
+                <a:hlinkClick r:id="rId6"/>
+              </a:rPr>
+              <a:t>https://github.com/lukeryannetnz/StaticCodeAnalysis.Presentation</a:t>
             </a:r>
           </a:p>
           <a:p>

</xml_diff>